<commit_message>
add 5.3 5.4 5.5
</commit_message>
<xml_diff>
--- a/materials/slides/3.1.pptx
+++ b/materials/slides/3.1.pptx
@@ -13273,21 +13273,21 @@
                 <a:gridCol w="2908176">
                   <a:extLst>
                     <a:ext uri="{9D8B030D-6E8A-4147-A177-3AD203B41FA5}">
-                      <a16:colId xmlns="" xmlns:a16="http://schemas.microsoft.com/office/drawing/2014/main" val="20000"/>
+                      <a16:colId xmlns:a16="http://schemas.microsoft.com/office/drawing/2014/main" xmlns="" val="20000"/>
                     </a:ext>
                   </a:extLst>
                 </a:gridCol>
                 <a:gridCol w="2958172">
                   <a:extLst>
                     <a:ext uri="{9D8B030D-6E8A-4147-A177-3AD203B41FA5}">
-                      <a16:colId xmlns="" xmlns:a16="http://schemas.microsoft.com/office/drawing/2014/main" val="20001"/>
+                      <a16:colId xmlns:a16="http://schemas.microsoft.com/office/drawing/2014/main" xmlns="" val="20001"/>
                     </a:ext>
                   </a:extLst>
                 </a:gridCol>
                 <a:gridCol w="2990636">
                   <a:extLst>
                     <a:ext uri="{9D8B030D-6E8A-4147-A177-3AD203B41FA5}">
-                      <a16:colId xmlns="" xmlns:a16="http://schemas.microsoft.com/office/drawing/2014/main" val="20002"/>
+                      <a16:colId xmlns:a16="http://schemas.microsoft.com/office/drawing/2014/main" xmlns="" val="20002"/>
                     </a:ext>
                   </a:extLst>
                 </a:gridCol>
@@ -13488,7 +13488,7 @@
                 </a:tc>
                 <a:extLst>
                   <a:ext uri="{0D108BD9-81ED-4DB2-BD59-A6C34878D82A}">
-                    <a16:rowId xmlns="" xmlns:a16="http://schemas.microsoft.com/office/drawing/2014/main" val="10000"/>
+                    <a16:rowId xmlns:a16="http://schemas.microsoft.com/office/drawing/2014/main" xmlns="" val="10000"/>
                   </a:ext>
                 </a:extLst>
               </a:tr>
@@ -13725,7 +13725,7 @@
                 </a:tc>
                 <a:extLst>
                   <a:ext uri="{0D108BD9-81ED-4DB2-BD59-A6C34878D82A}">
-                    <a16:rowId xmlns="" xmlns:a16="http://schemas.microsoft.com/office/drawing/2014/main" val="10001"/>
+                    <a16:rowId xmlns:a16="http://schemas.microsoft.com/office/drawing/2014/main" xmlns="" val="10001"/>
                   </a:ext>
                 </a:extLst>
               </a:tr>
@@ -13923,7 +13923,7 @@
                 </a:tc>
                 <a:extLst>
                   <a:ext uri="{0D108BD9-81ED-4DB2-BD59-A6C34878D82A}">
-                    <a16:rowId xmlns="" xmlns:a16="http://schemas.microsoft.com/office/drawing/2014/main" val="10002"/>
+                    <a16:rowId xmlns:a16="http://schemas.microsoft.com/office/drawing/2014/main" xmlns="" val="10002"/>
                   </a:ext>
                 </a:extLst>
               </a:tr>
@@ -14009,7 +14009,7 @@
                 </a:tc>
                 <a:extLst>
                   <a:ext uri="{0D108BD9-81ED-4DB2-BD59-A6C34878D82A}">
-                    <a16:rowId xmlns="" xmlns:a16="http://schemas.microsoft.com/office/drawing/2014/main" val="10003"/>
+                    <a16:rowId xmlns:a16="http://schemas.microsoft.com/office/drawing/2014/main" xmlns="" val="10003"/>
                   </a:ext>
                 </a:extLst>
               </a:tr>
@@ -14095,7 +14095,7 @@
                 </a:tc>
                 <a:extLst>
                   <a:ext uri="{0D108BD9-81ED-4DB2-BD59-A6C34878D82A}">
-                    <a16:rowId xmlns="" xmlns:a16="http://schemas.microsoft.com/office/drawing/2014/main" val="10004"/>
+                    <a16:rowId xmlns:a16="http://schemas.microsoft.com/office/drawing/2014/main" xmlns="" val="10004"/>
                   </a:ext>
                 </a:extLst>
               </a:tr>
@@ -14188,7 +14188,7 @@
                 </a:tc>
                 <a:extLst>
                   <a:ext uri="{0D108BD9-81ED-4DB2-BD59-A6C34878D82A}">
-                    <a16:rowId xmlns="" xmlns:a16="http://schemas.microsoft.com/office/drawing/2014/main" val="10005"/>
+                    <a16:rowId xmlns:a16="http://schemas.microsoft.com/office/drawing/2014/main" xmlns="" val="10005"/>
                   </a:ext>
                 </a:extLst>
               </a:tr>
@@ -14281,7 +14281,7 @@
                 </a:tc>
                 <a:extLst>
                   <a:ext uri="{0D108BD9-81ED-4DB2-BD59-A6C34878D82A}">
-                    <a16:rowId xmlns="" xmlns:a16="http://schemas.microsoft.com/office/drawing/2014/main" val="10006"/>
+                    <a16:rowId xmlns:a16="http://schemas.microsoft.com/office/drawing/2014/main" xmlns="" val="10006"/>
                   </a:ext>
                 </a:extLst>
               </a:tr>
@@ -14374,7 +14374,7 @@
                 </a:tc>
                 <a:extLst>
                   <a:ext uri="{0D108BD9-81ED-4DB2-BD59-A6C34878D82A}">
-                    <a16:rowId xmlns="" xmlns:a16="http://schemas.microsoft.com/office/drawing/2014/main" val="10007"/>
+                    <a16:rowId xmlns:a16="http://schemas.microsoft.com/office/drawing/2014/main" xmlns="" val="10007"/>
                   </a:ext>
                 </a:extLst>
               </a:tr>
@@ -14467,7 +14467,7 @@
                 </a:tc>
                 <a:extLst>
                   <a:ext uri="{0D108BD9-81ED-4DB2-BD59-A6C34878D82A}">
-                    <a16:rowId xmlns="" xmlns:a16="http://schemas.microsoft.com/office/drawing/2014/main" val="10008"/>
+                    <a16:rowId xmlns:a16="http://schemas.microsoft.com/office/drawing/2014/main" xmlns="" val="10008"/>
                   </a:ext>
                 </a:extLst>
               </a:tr>
@@ -14561,35 +14561,35 @@
                 <a:gridCol w="1656184">
                   <a:extLst>
                     <a:ext uri="{9D8B030D-6E8A-4147-A177-3AD203B41FA5}">
-                      <a16:colId xmlns="" xmlns:a16="http://schemas.microsoft.com/office/drawing/2014/main" val="20000"/>
+                      <a16:colId xmlns:a16="http://schemas.microsoft.com/office/drawing/2014/main" xmlns="" val="20000"/>
                     </a:ext>
                   </a:extLst>
                 </a:gridCol>
                 <a:gridCol w="2351936">
                   <a:extLst>
                     <a:ext uri="{9D8B030D-6E8A-4147-A177-3AD203B41FA5}">
-                      <a16:colId xmlns="" xmlns:a16="http://schemas.microsoft.com/office/drawing/2014/main" val="20001"/>
+                      <a16:colId xmlns:a16="http://schemas.microsoft.com/office/drawing/2014/main" xmlns="" val="20001"/>
                     </a:ext>
                   </a:extLst>
                 </a:gridCol>
                 <a:gridCol w="2004060">
                   <a:extLst>
                     <a:ext uri="{9D8B030D-6E8A-4147-A177-3AD203B41FA5}">
-                      <a16:colId xmlns="" xmlns:a16="http://schemas.microsoft.com/office/drawing/2014/main" val="20002"/>
+                      <a16:colId xmlns:a16="http://schemas.microsoft.com/office/drawing/2014/main" xmlns="" val="20002"/>
                     </a:ext>
                   </a:extLst>
                 </a:gridCol>
                 <a:gridCol w="2004060">
                   <a:extLst>
                     <a:ext uri="{9D8B030D-6E8A-4147-A177-3AD203B41FA5}">
-                      <a16:colId xmlns="" xmlns:a16="http://schemas.microsoft.com/office/drawing/2014/main" val="20003"/>
+                      <a16:colId xmlns:a16="http://schemas.microsoft.com/office/drawing/2014/main" xmlns="" val="20003"/>
                     </a:ext>
                   </a:extLst>
                 </a:gridCol>
                 <a:gridCol w="2004060">
                   <a:extLst>
                     <a:ext uri="{9D8B030D-6E8A-4147-A177-3AD203B41FA5}">
-                      <a16:colId xmlns="" xmlns:a16="http://schemas.microsoft.com/office/drawing/2014/main" val="20004"/>
+                      <a16:colId xmlns:a16="http://schemas.microsoft.com/office/drawing/2014/main" xmlns="" val="20004"/>
                     </a:ext>
                   </a:extLst>
                 </a:gridCol>
@@ -14914,7 +14914,7 @@
                 </a:tc>
                 <a:extLst>
                   <a:ext uri="{0D108BD9-81ED-4DB2-BD59-A6C34878D82A}">
-                    <a16:rowId xmlns="" xmlns:a16="http://schemas.microsoft.com/office/drawing/2014/main" val="10000"/>
+                    <a16:rowId xmlns:a16="http://schemas.microsoft.com/office/drawing/2014/main" xmlns="" val="10000"/>
                   </a:ext>
                 </a:extLst>
               </a:tr>
@@ -15230,7 +15230,7 @@
                 </a:tc>
                 <a:extLst>
                   <a:ext uri="{0D108BD9-81ED-4DB2-BD59-A6C34878D82A}">
-                    <a16:rowId xmlns="" xmlns:a16="http://schemas.microsoft.com/office/drawing/2014/main" val="10001"/>
+                    <a16:rowId xmlns:a16="http://schemas.microsoft.com/office/drawing/2014/main" xmlns="" val="10001"/>
                   </a:ext>
                 </a:extLst>
               </a:tr>
@@ -15554,7 +15554,7 @@
                 </a:tc>
                 <a:extLst>
                   <a:ext uri="{0D108BD9-81ED-4DB2-BD59-A6C34878D82A}">
-                    <a16:rowId xmlns="" xmlns:a16="http://schemas.microsoft.com/office/drawing/2014/main" val="10002"/>
+                    <a16:rowId xmlns:a16="http://schemas.microsoft.com/office/drawing/2014/main" xmlns="" val="10002"/>
                   </a:ext>
                 </a:extLst>
               </a:tr>
@@ -15829,7 +15829,7 @@
                 </a:tc>
                 <a:extLst>
                   <a:ext uri="{0D108BD9-81ED-4DB2-BD59-A6C34878D82A}">
-                    <a16:rowId xmlns="" xmlns:a16="http://schemas.microsoft.com/office/drawing/2014/main" val="10003"/>
+                    <a16:rowId xmlns:a16="http://schemas.microsoft.com/office/drawing/2014/main" xmlns="" val="10003"/>
                   </a:ext>
                 </a:extLst>
               </a:tr>
@@ -16104,7 +16104,7 @@
                 </a:tc>
                 <a:extLst>
                   <a:ext uri="{0D108BD9-81ED-4DB2-BD59-A6C34878D82A}">
-                    <a16:rowId xmlns="" xmlns:a16="http://schemas.microsoft.com/office/drawing/2014/main" val="10004"/>
+                    <a16:rowId xmlns:a16="http://schemas.microsoft.com/office/drawing/2014/main" xmlns="" val="10004"/>
                   </a:ext>
                 </a:extLst>
               </a:tr>
@@ -16379,7 +16379,7 @@
                 </a:tc>
                 <a:extLst>
                   <a:ext uri="{0D108BD9-81ED-4DB2-BD59-A6C34878D82A}">
-                    <a16:rowId xmlns="" xmlns:a16="http://schemas.microsoft.com/office/drawing/2014/main" val="10005"/>
+                    <a16:rowId xmlns:a16="http://schemas.microsoft.com/office/drawing/2014/main" xmlns="" val="10005"/>
                   </a:ext>
                 </a:extLst>
               </a:tr>
@@ -16664,7 +16664,7 @@
                 </a:tc>
                 <a:extLst>
                   <a:ext uri="{0D108BD9-81ED-4DB2-BD59-A6C34878D82A}">
-                    <a16:rowId xmlns="" xmlns:a16="http://schemas.microsoft.com/office/drawing/2014/main" val="10006"/>
+                    <a16:rowId xmlns:a16="http://schemas.microsoft.com/office/drawing/2014/main" xmlns="" val="10006"/>
                   </a:ext>
                 </a:extLst>
               </a:tr>
@@ -16944,7 +16944,7 @@
                 </a:tc>
                 <a:extLst>
                   <a:ext uri="{0D108BD9-81ED-4DB2-BD59-A6C34878D82A}">
-                    <a16:rowId xmlns="" xmlns:a16="http://schemas.microsoft.com/office/drawing/2014/main" val="10007"/>
+                    <a16:rowId xmlns:a16="http://schemas.microsoft.com/office/drawing/2014/main" xmlns="" val="10007"/>
                   </a:ext>
                 </a:extLst>
               </a:tr>
@@ -17224,7 +17224,7 @@
                 </a:tc>
                 <a:extLst>
                   <a:ext uri="{0D108BD9-81ED-4DB2-BD59-A6C34878D82A}">
-                    <a16:rowId xmlns="" xmlns:a16="http://schemas.microsoft.com/office/drawing/2014/main" val="10008"/>
+                    <a16:rowId xmlns:a16="http://schemas.microsoft.com/office/drawing/2014/main" xmlns="" val="10008"/>
                   </a:ext>
                 </a:extLst>
               </a:tr>
@@ -17504,7 +17504,7 @@
                 </a:tc>
                 <a:extLst>
                   <a:ext uri="{0D108BD9-81ED-4DB2-BD59-A6C34878D82A}">
-                    <a16:rowId xmlns="" xmlns:a16="http://schemas.microsoft.com/office/drawing/2014/main" val="10009"/>
+                    <a16:rowId xmlns:a16="http://schemas.microsoft.com/office/drawing/2014/main" xmlns="" val="10009"/>
                   </a:ext>
                 </a:extLst>
               </a:tr>
@@ -19025,28 +19025,28 @@
                 <a:gridCol w="1872208">
                   <a:extLst>
                     <a:ext uri="{9D8B030D-6E8A-4147-A177-3AD203B41FA5}">
-                      <a16:colId xmlns="" xmlns:a16="http://schemas.microsoft.com/office/drawing/2014/main" val="20000"/>
+                      <a16:colId xmlns:a16="http://schemas.microsoft.com/office/drawing/2014/main" xmlns="" val="20000"/>
                     </a:ext>
                   </a:extLst>
                 </a:gridCol>
                 <a:gridCol w="3744416">
                   <a:extLst>
                     <a:ext uri="{9D8B030D-6E8A-4147-A177-3AD203B41FA5}">
-                      <a16:colId xmlns="" xmlns:a16="http://schemas.microsoft.com/office/drawing/2014/main" val="20001"/>
+                      <a16:colId xmlns:a16="http://schemas.microsoft.com/office/drawing/2014/main" xmlns="" val="20001"/>
                     </a:ext>
                   </a:extLst>
                 </a:gridCol>
                 <a:gridCol w="1998222">
                   <a:extLst>
                     <a:ext uri="{9D8B030D-6E8A-4147-A177-3AD203B41FA5}">
-                      <a16:colId xmlns="" xmlns:a16="http://schemas.microsoft.com/office/drawing/2014/main" val="20002"/>
+                      <a16:colId xmlns:a16="http://schemas.microsoft.com/office/drawing/2014/main" xmlns="" val="20002"/>
                     </a:ext>
                   </a:extLst>
                 </a:gridCol>
                 <a:gridCol w="2538282">
                   <a:extLst>
                     <a:ext uri="{9D8B030D-6E8A-4147-A177-3AD203B41FA5}">
-                      <a16:colId xmlns="" xmlns:a16="http://schemas.microsoft.com/office/drawing/2014/main" val="20003"/>
+                      <a16:colId xmlns:a16="http://schemas.microsoft.com/office/drawing/2014/main" xmlns="" val="20003"/>
                     </a:ext>
                   </a:extLst>
                 </a:gridCol>
@@ -19282,7 +19282,7 @@
                 </a:tc>
                 <a:extLst>
                   <a:ext uri="{0D108BD9-81ED-4DB2-BD59-A6C34878D82A}">
-                    <a16:rowId xmlns="" xmlns:a16="http://schemas.microsoft.com/office/drawing/2014/main" val="10000"/>
+                    <a16:rowId xmlns:a16="http://schemas.microsoft.com/office/drawing/2014/main" xmlns="" val="10000"/>
                   </a:ext>
                 </a:extLst>
               </a:tr>
@@ -19562,7 +19562,7 @@
                 </a:tc>
                 <a:extLst>
                   <a:ext uri="{0D108BD9-81ED-4DB2-BD59-A6C34878D82A}">
-                    <a16:rowId xmlns="" xmlns:a16="http://schemas.microsoft.com/office/drawing/2014/main" val="10001"/>
+                    <a16:rowId xmlns:a16="http://schemas.microsoft.com/office/drawing/2014/main" xmlns="" val="10001"/>
                   </a:ext>
                 </a:extLst>
               </a:tr>
@@ -19835,7 +19835,7 @@
                 </a:tc>
                 <a:extLst>
                   <a:ext uri="{0D108BD9-81ED-4DB2-BD59-A6C34878D82A}">
-                    <a16:rowId xmlns="" xmlns:a16="http://schemas.microsoft.com/office/drawing/2014/main" val="10002"/>
+                    <a16:rowId xmlns:a16="http://schemas.microsoft.com/office/drawing/2014/main" xmlns="" val="10002"/>
                   </a:ext>
                 </a:extLst>
               </a:tr>
@@ -20065,7 +20065,7 @@
                 </a:tc>
                 <a:extLst>
                   <a:ext uri="{0D108BD9-81ED-4DB2-BD59-A6C34878D82A}">
-                    <a16:rowId xmlns="" xmlns:a16="http://schemas.microsoft.com/office/drawing/2014/main" val="10003"/>
+                    <a16:rowId xmlns:a16="http://schemas.microsoft.com/office/drawing/2014/main" xmlns="" val="10003"/>
                   </a:ext>
                 </a:extLst>
               </a:tr>
@@ -20276,35 +20276,35 @@
                 <a:gridCol w="667168">
                   <a:extLst>
                     <a:ext uri="{9D8B030D-6E8A-4147-A177-3AD203B41FA5}">
-                      <a16:colId xmlns="" xmlns:a16="http://schemas.microsoft.com/office/drawing/2014/main" val="20000"/>
+                      <a16:colId xmlns:a16="http://schemas.microsoft.com/office/drawing/2014/main" xmlns="" val="20000"/>
                     </a:ext>
                   </a:extLst>
                 </a:gridCol>
                 <a:gridCol w="1349056">
                   <a:extLst>
                     <a:ext uri="{9D8B030D-6E8A-4147-A177-3AD203B41FA5}">
-                      <a16:colId xmlns="" xmlns:a16="http://schemas.microsoft.com/office/drawing/2014/main" val="20001"/>
+                      <a16:colId xmlns:a16="http://schemas.microsoft.com/office/drawing/2014/main" xmlns="" val="20001"/>
                     </a:ext>
                   </a:extLst>
                 </a:gridCol>
                 <a:gridCol w="3312368">
                   <a:extLst>
                     <a:ext uri="{9D8B030D-6E8A-4147-A177-3AD203B41FA5}">
-                      <a16:colId xmlns="" xmlns:a16="http://schemas.microsoft.com/office/drawing/2014/main" val="20002"/>
+                      <a16:colId xmlns:a16="http://schemas.microsoft.com/office/drawing/2014/main" xmlns="" val="20002"/>
                     </a:ext>
                   </a:extLst>
                 </a:gridCol>
                 <a:gridCol w="3672408">
                   <a:extLst>
                     <a:ext uri="{9D8B030D-6E8A-4147-A177-3AD203B41FA5}">
-                      <a16:colId xmlns="" xmlns:a16="http://schemas.microsoft.com/office/drawing/2014/main" val="20003"/>
+                      <a16:colId xmlns:a16="http://schemas.microsoft.com/office/drawing/2014/main" xmlns="" val="20003"/>
                     </a:ext>
                   </a:extLst>
                 </a:gridCol>
                 <a:gridCol w="1872208">
                   <a:extLst>
                     <a:ext uri="{9D8B030D-6E8A-4147-A177-3AD203B41FA5}">
-                      <a16:colId xmlns="" xmlns:a16="http://schemas.microsoft.com/office/drawing/2014/main" val="20004"/>
+                      <a16:colId xmlns:a16="http://schemas.microsoft.com/office/drawing/2014/main" xmlns="" val="20004"/>
                     </a:ext>
                   </a:extLst>
                 </a:gridCol>
@@ -20614,7 +20614,7 @@
                 </a:tc>
                 <a:extLst>
                   <a:ext uri="{0D108BD9-81ED-4DB2-BD59-A6C34878D82A}">
-                    <a16:rowId xmlns="" xmlns:a16="http://schemas.microsoft.com/office/drawing/2014/main" val="10000"/>
+                    <a16:rowId xmlns:a16="http://schemas.microsoft.com/office/drawing/2014/main" xmlns="" val="10000"/>
                   </a:ext>
                 </a:extLst>
               </a:tr>
@@ -20954,7 +20954,7 @@
                 </a:tc>
                 <a:extLst>
                   <a:ext uri="{0D108BD9-81ED-4DB2-BD59-A6C34878D82A}">
-                    <a16:rowId xmlns="" xmlns:a16="http://schemas.microsoft.com/office/drawing/2014/main" val="10001"/>
+                    <a16:rowId xmlns:a16="http://schemas.microsoft.com/office/drawing/2014/main" xmlns="" val="10001"/>
                   </a:ext>
                 </a:extLst>
               </a:tr>
@@ -21298,7 +21298,7 @@
                 </a:tc>
                 <a:extLst>
                   <a:ext uri="{0D108BD9-81ED-4DB2-BD59-A6C34878D82A}">
-                    <a16:rowId xmlns="" xmlns:a16="http://schemas.microsoft.com/office/drawing/2014/main" val="10002"/>
+                    <a16:rowId xmlns:a16="http://schemas.microsoft.com/office/drawing/2014/main" xmlns="" val="10002"/>
                   </a:ext>
                 </a:extLst>
               </a:tr>
@@ -21642,7 +21642,7 @@
                 </a:tc>
                 <a:extLst>
                   <a:ext uri="{0D108BD9-81ED-4DB2-BD59-A6C34878D82A}">
-                    <a16:rowId xmlns="" xmlns:a16="http://schemas.microsoft.com/office/drawing/2014/main" val="10003"/>
+                    <a16:rowId xmlns:a16="http://schemas.microsoft.com/office/drawing/2014/main" xmlns="" val="10003"/>
                   </a:ext>
                 </a:extLst>
               </a:tr>
@@ -21986,7 +21986,7 @@
                 </a:tc>
                 <a:extLst>
                   <a:ext uri="{0D108BD9-81ED-4DB2-BD59-A6C34878D82A}">
-                    <a16:rowId xmlns="" xmlns:a16="http://schemas.microsoft.com/office/drawing/2014/main" val="10004"/>
+                    <a16:rowId xmlns:a16="http://schemas.microsoft.com/office/drawing/2014/main" xmlns="" val="10004"/>
                   </a:ext>
                 </a:extLst>
               </a:tr>
@@ -22330,7 +22330,7 @@
                 </a:tc>
                 <a:extLst>
                   <a:ext uri="{0D108BD9-81ED-4DB2-BD59-A6C34878D82A}">
-                    <a16:rowId xmlns="" xmlns:a16="http://schemas.microsoft.com/office/drawing/2014/main" val="10005"/>
+                    <a16:rowId xmlns:a16="http://schemas.microsoft.com/office/drawing/2014/main" xmlns="" val="10005"/>
                   </a:ext>
                 </a:extLst>
               </a:tr>
@@ -22674,7 +22674,7 @@
                 </a:tc>
                 <a:extLst>
                   <a:ext uri="{0D108BD9-81ED-4DB2-BD59-A6C34878D82A}">
-                    <a16:rowId xmlns="" xmlns:a16="http://schemas.microsoft.com/office/drawing/2014/main" val="10006"/>
+                    <a16:rowId xmlns:a16="http://schemas.microsoft.com/office/drawing/2014/main" xmlns="" val="10006"/>
                   </a:ext>
                 </a:extLst>
               </a:tr>
@@ -22800,28 +22800,28 @@
                 <a:gridCol w="2736304">
                   <a:extLst>
                     <a:ext uri="{9D8B030D-6E8A-4147-A177-3AD203B41FA5}">
-                      <a16:colId xmlns="" xmlns:a16="http://schemas.microsoft.com/office/drawing/2014/main" val="20000"/>
+                      <a16:colId xmlns:a16="http://schemas.microsoft.com/office/drawing/2014/main" xmlns="" val="20000"/>
                     </a:ext>
                   </a:extLst>
                 </a:gridCol>
                 <a:gridCol w="2736304">
                   <a:extLst>
                     <a:ext uri="{9D8B030D-6E8A-4147-A177-3AD203B41FA5}">
-                      <a16:colId xmlns="" xmlns:a16="http://schemas.microsoft.com/office/drawing/2014/main" val="20001"/>
+                      <a16:colId xmlns:a16="http://schemas.microsoft.com/office/drawing/2014/main" xmlns="" val="20001"/>
                     </a:ext>
                   </a:extLst>
                 </a:gridCol>
                 <a:gridCol w="2736304">
                   <a:extLst>
                     <a:ext uri="{9D8B030D-6E8A-4147-A177-3AD203B41FA5}">
-                      <a16:colId xmlns="" xmlns:a16="http://schemas.microsoft.com/office/drawing/2014/main" val="20002"/>
+                      <a16:colId xmlns:a16="http://schemas.microsoft.com/office/drawing/2014/main" xmlns="" val="20002"/>
                     </a:ext>
                   </a:extLst>
                 </a:gridCol>
                 <a:gridCol w="2736304">
                   <a:extLst>
                     <a:ext uri="{9D8B030D-6E8A-4147-A177-3AD203B41FA5}">
-                      <a16:colId xmlns="" xmlns:a16="http://schemas.microsoft.com/office/drawing/2014/main" val="20003"/>
+                      <a16:colId xmlns:a16="http://schemas.microsoft.com/office/drawing/2014/main" xmlns="" val="20003"/>
                     </a:ext>
                   </a:extLst>
                 </a:gridCol>
@@ -22965,7 +22965,7 @@
                 </a:tc>
                 <a:extLst>
                   <a:ext uri="{0D108BD9-81ED-4DB2-BD59-A6C34878D82A}">
-                    <a16:rowId xmlns="" xmlns:a16="http://schemas.microsoft.com/office/drawing/2014/main" val="10000"/>
+                    <a16:rowId xmlns:a16="http://schemas.microsoft.com/office/drawing/2014/main" xmlns="" val="10000"/>
                   </a:ext>
                 </a:extLst>
               </a:tr>
@@ -23048,7 +23048,7 @@
                 </a:tc>
                 <a:extLst>
                   <a:ext uri="{0D108BD9-81ED-4DB2-BD59-A6C34878D82A}">
-                    <a16:rowId xmlns="" xmlns:a16="http://schemas.microsoft.com/office/drawing/2014/main" val="10001"/>
+                    <a16:rowId xmlns:a16="http://schemas.microsoft.com/office/drawing/2014/main" xmlns="" val="10001"/>
                   </a:ext>
                 </a:extLst>
               </a:tr>
@@ -23170,28 +23170,28 @@
                 <a:gridCol w="1296144">
                   <a:extLst>
                     <a:ext uri="{9D8B030D-6E8A-4147-A177-3AD203B41FA5}">
-                      <a16:colId xmlns="" xmlns:a16="http://schemas.microsoft.com/office/drawing/2014/main" val="20000"/>
+                      <a16:colId xmlns:a16="http://schemas.microsoft.com/office/drawing/2014/main" xmlns="" val="20000"/>
                     </a:ext>
                   </a:extLst>
                 </a:gridCol>
                 <a:gridCol w="3888432">
                   <a:extLst>
                     <a:ext uri="{9D8B030D-6E8A-4147-A177-3AD203B41FA5}">
-                      <a16:colId xmlns="" xmlns:a16="http://schemas.microsoft.com/office/drawing/2014/main" val="20001"/>
+                      <a16:colId xmlns:a16="http://schemas.microsoft.com/office/drawing/2014/main" xmlns="" val="20001"/>
                     </a:ext>
                   </a:extLst>
                 </a:gridCol>
                 <a:gridCol w="2952328">
                   <a:extLst>
                     <a:ext uri="{9D8B030D-6E8A-4147-A177-3AD203B41FA5}">
-                      <a16:colId xmlns="" xmlns:a16="http://schemas.microsoft.com/office/drawing/2014/main" val="20002"/>
+                      <a16:colId xmlns:a16="http://schemas.microsoft.com/office/drawing/2014/main" xmlns="" val="20002"/>
                     </a:ext>
                   </a:extLst>
                 </a:gridCol>
                 <a:gridCol w="2952328">
                   <a:extLst>
                     <a:ext uri="{9D8B030D-6E8A-4147-A177-3AD203B41FA5}">
-                      <a16:colId xmlns="" xmlns:a16="http://schemas.microsoft.com/office/drawing/2014/main" val="20003"/>
+                      <a16:colId xmlns:a16="http://schemas.microsoft.com/office/drawing/2014/main" xmlns="" val="20003"/>
                     </a:ext>
                   </a:extLst>
                 </a:gridCol>
@@ -23279,7 +23279,7 @@
                 </a:tc>
                 <a:extLst>
                   <a:ext uri="{0D108BD9-81ED-4DB2-BD59-A6C34878D82A}">
-                    <a16:rowId xmlns="" xmlns:a16="http://schemas.microsoft.com/office/drawing/2014/main" val="10000"/>
+                    <a16:rowId xmlns:a16="http://schemas.microsoft.com/office/drawing/2014/main" xmlns="" val="10000"/>
                   </a:ext>
                 </a:extLst>
               </a:tr>
@@ -23393,7 +23393,7 @@
                 </a:tc>
                 <a:extLst>
                   <a:ext uri="{0D108BD9-81ED-4DB2-BD59-A6C34878D82A}">
-                    <a16:rowId xmlns="" xmlns:a16="http://schemas.microsoft.com/office/drawing/2014/main" val="10001"/>
+                    <a16:rowId xmlns:a16="http://schemas.microsoft.com/office/drawing/2014/main" xmlns="" val="10001"/>
                   </a:ext>
                 </a:extLst>
               </a:tr>
@@ -23487,7 +23487,7 @@
                 </a:tc>
                 <a:extLst>
                   <a:ext uri="{0D108BD9-81ED-4DB2-BD59-A6C34878D82A}">
-                    <a16:rowId xmlns="" xmlns:a16="http://schemas.microsoft.com/office/drawing/2014/main" val="10002"/>
+                    <a16:rowId xmlns:a16="http://schemas.microsoft.com/office/drawing/2014/main" xmlns="" val="10002"/>
                   </a:ext>
                 </a:extLst>
               </a:tr>
@@ -23557,7 +23557,7 @@
                 </a:tc>
                 <a:extLst>
                   <a:ext uri="{0D108BD9-81ED-4DB2-BD59-A6C34878D82A}">
-                    <a16:rowId xmlns="" xmlns:a16="http://schemas.microsoft.com/office/drawing/2014/main" val="10003"/>
+                    <a16:rowId xmlns:a16="http://schemas.microsoft.com/office/drawing/2014/main" xmlns="" val="10003"/>
                   </a:ext>
                 </a:extLst>
               </a:tr>
@@ -23620,7 +23620,7 @@
                 </a:tc>
                 <a:extLst>
                   <a:ext uri="{0D108BD9-81ED-4DB2-BD59-A6C34878D82A}">
-                    <a16:rowId xmlns="" xmlns:a16="http://schemas.microsoft.com/office/drawing/2014/main" val="10004"/>
+                    <a16:rowId xmlns:a16="http://schemas.microsoft.com/office/drawing/2014/main" xmlns="" val="10004"/>
                   </a:ext>
                 </a:extLst>
               </a:tr>
@@ -23683,7 +23683,7 @@
                 </a:tc>
                 <a:extLst>
                   <a:ext uri="{0D108BD9-81ED-4DB2-BD59-A6C34878D82A}">
-                    <a16:rowId xmlns="" xmlns:a16="http://schemas.microsoft.com/office/drawing/2014/main" val="10005"/>
+                    <a16:rowId xmlns:a16="http://schemas.microsoft.com/office/drawing/2014/main" xmlns="" val="10005"/>
                   </a:ext>
                 </a:extLst>
               </a:tr>
@@ -23746,85 +23746,100 @@
           </a:p>
         </p:txBody>
       </p:sp>
-      <p:pic>
-        <p:nvPicPr>
-          <p:cNvPr id="4" name="图片 3"/>
-          <p:cNvPicPr>
-            <a:picLocks noChangeAspect="1"/>
-          </p:cNvPicPr>
+      <p:grpSp>
+        <p:nvGrpSpPr>
+          <p:cNvPr id="3" name="组合 2"/>
+          <p:cNvGrpSpPr/>
           <p:nvPr/>
-        </p:nvPicPr>
-        <p:blipFill>
-          <a:blip r:embed="rId3"/>
-          <a:stretch>
-            <a:fillRect/>
-          </a:stretch>
-        </p:blipFill>
-        <p:spPr>
+        </p:nvGrpSpPr>
+        <p:grpSpPr>
           <a:xfrm>
-            <a:off x="4871864" y="620688"/>
-            <a:ext cx="3805730" cy="5749083"/>
+            <a:off x="5231904" y="548680"/>
+            <a:ext cx="3960440" cy="5749083"/>
+            <a:chOff x="4871864" y="620688"/>
+            <a:chExt cx="3960440" cy="5749083"/>
           </a:xfrm>
-          <a:prstGeom prst="rect">
-            <a:avLst/>
-          </a:prstGeom>
-        </p:spPr>
-      </p:pic>
-      <p:sp>
-        <p:nvSpPr>
-          <p:cNvPr id="2" name="圆角矩形 1"/>
-          <p:cNvSpPr/>
-          <p:nvPr/>
-        </p:nvSpPr>
-        <p:spPr>
-          <a:xfrm>
-            <a:off x="7248128" y="5589240"/>
-            <a:ext cx="1584176" cy="576064"/>
-          </a:xfrm>
-          <a:prstGeom prst="roundRect">
-            <a:avLst/>
-          </a:prstGeom>
-          <a:solidFill>
-            <a:srgbClr val="99CCFF"/>
-          </a:solidFill>
-        </p:spPr>
-        <p:style>
-          <a:lnRef idx="2">
-            <a:schemeClr val="accent1">
-              <a:shade val="50000"/>
-            </a:schemeClr>
-          </a:lnRef>
-          <a:fillRef idx="1">
-            <a:schemeClr val="accent1"/>
-          </a:fillRef>
-          <a:effectRef idx="0">
-            <a:schemeClr val="accent1"/>
-          </a:effectRef>
-          <a:fontRef idx="minor">
-            <a:schemeClr val="lt1"/>
-          </a:fontRef>
-        </p:style>
-        <p:txBody>
-          <a:bodyPr rtlCol="0" anchor="ctr"/>
-          <a:lstStyle/>
-          <a:p>
-            <a:pPr algn="ctr"/>
-            <a:r>
-              <a:rPr lang="zh-CN" altLang="en-US" sz="2000" dirty="0" smtClean="0">
+        </p:grpSpPr>
+        <p:pic>
+          <p:nvPicPr>
+            <p:cNvPr id="4" name="图片 3"/>
+            <p:cNvPicPr>
+              <a:picLocks noChangeAspect="1"/>
+            </p:cNvPicPr>
+            <p:nvPr/>
+          </p:nvPicPr>
+          <p:blipFill>
+            <a:blip r:embed="rId3"/>
+            <a:stretch>
+              <a:fillRect/>
+            </a:stretch>
+          </p:blipFill>
+          <p:spPr>
+            <a:xfrm>
+              <a:off x="4871864" y="620688"/>
+              <a:ext cx="3805730" cy="5749083"/>
+            </a:xfrm>
+            <a:prstGeom prst="rect">
+              <a:avLst/>
+            </a:prstGeom>
+          </p:spPr>
+        </p:pic>
+        <p:sp>
+          <p:nvSpPr>
+            <p:cNvPr id="2" name="圆角矩形 1"/>
+            <p:cNvSpPr/>
+            <p:nvPr/>
+          </p:nvSpPr>
+          <p:spPr>
+            <a:xfrm>
+              <a:off x="7248128" y="5589240"/>
+              <a:ext cx="1584176" cy="576064"/>
+            </a:xfrm>
+            <a:prstGeom prst="roundRect">
+              <a:avLst/>
+            </a:prstGeom>
+            <a:solidFill>
+              <a:srgbClr val="99CCFF"/>
+            </a:solidFill>
+          </p:spPr>
+          <p:style>
+            <a:lnRef idx="2">
+              <a:schemeClr val="accent1">
+                <a:shade val="50000"/>
+              </a:schemeClr>
+            </a:lnRef>
+            <a:fillRef idx="1">
+              <a:schemeClr val="accent1"/>
+            </a:fillRef>
+            <a:effectRef idx="0">
+              <a:schemeClr val="accent1"/>
+            </a:effectRef>
+            <a:fontRef idx="minor">
+              <a:schemeClr val="lt1"/>
+            </a:fontRef>
+          </p:style>
+          <p:txBody>
+            <a:bodyPr rtlCol="0" anchor="ctr"/>
+            <a:lstStyle/>
+            <a:p>
+              <a:pPr algn="ctr"/>
+              <a:r>
+                <a:rPr lang="zh-CN" altLang="en-US" sz="2000" dirty="0" smtClean="0">
+                  <a:solidFill>
+                    <a:schemeClr val="tx1"/>
+                  </a:solidFill>
+                </a:rPr>
+                <a:t>错误推测法</a:t>
+              </a:r>
+              <a:endParaRPr lang="zh-CN" altLang="en-US" sz="2000" dirty="0">
                 <a:solidFill>
                   <a:schemeClr val="tx1"/>
                 </a:solidFill>
-              </a:rPr>
-              <a:t>错误推测法</a:t>
-            </a:r>
-            <a:endParaRPr lang="zh-CN" altLang="en-US" sz="2000" dirty="0">
-              <a:solidFill>
-                <a:schemeClr val="tx1"/>
-              </a:solidFill>
-            </a:endParaRPr>
-          </a:p>
-        </p:txBody>
-      </p:sp>
+              </a:endParaRPr>
+            </a:p>
+          </p:txBody>
+        </p:sp>
+      </p:grpSp>
     </p:spTree>
   </p:cSld>
   <p:clrMapOvr>
@@ -24539,35 +24554,35 @@
                 <a:gridCol w="1512168">
                   <a:extLst>
                     <a:ext uri="{9D8B030D-6E8A-4147-A177-3AD203B41FA5}">
-                      <a16:colId xmlns="" xmlns:a16="http://schemas.microsoft.com/office/drawing/2014/main" val="20000"/>
+                      <a16:colId xmlns:a16="http://schemas.microsoft.com/office/drawing/2014/main" xmlns="" val="20000"/>
                     </a:ext>
                   </a:extLst>
                 </a:gridCol>
                 <a:gridCol w="2448272">
                   <a:extLst>
                     <a:ext uri="{9D8B030D-6E8A-4147-A177-3AD203B41FA5}">
-                      <a16:colId xmlns="" xmlns:a16="http://schemas.microsoft.com/office/drawing/2014/main" val="20001"/>
+                      <a16:colId xmlns:a16="http://schemas.microsoft.com/office/drawing/2014/main" xmlns="" val="20001"/>
                     </a:ext>
                   </a:extLst>
                 </a:gridCol>
                 <a:gridCol w="2448272">
                   <a:extLst>
                     <a:ext uri="{9D8B030D-6E8A-4147-A177-3AD203B41FA5}">
-                      <a16:colId xmlns="" xmlns:a16="http://schemas.microsoft.com/office/drawing/2014/main" val="20002"/>
+                      <a16:colId xmlns:a16="http://schemas.microsoft.com/office/drawing/2014/main" xmlns="" val="20002"/>
                     </a:ext>
                   </a:extLst>
                 </a:gridCol>
                 <a:gridCol w="1656184">
                   <a:extLst>
                     <a:ext uri="{9D8B030D-6E8A-4147-A177-3AD203B41FA5}">
-                      <a16:colId xmlns="" xmlns:a16="http://schemas.microsoft.com/office/drawing/2014/main" val="20003"/>
+                      <a16:colId xmlns:a16="http://schemas.microsoft.com/office/drawing/2014/main" xmlns="" val="20003"/>
                     </a:ext>
                   </a:extLst>
                 </a:gridCol>
                 <a:gridCol w="1368152">
                   <a:extLst>
                     <a:ext uri="{9D8B030D-6E8A-4147-A177-3AD203B41FA5}">
-                      <a16:colId xmlns="" xmlns:a16="http://schemas.microsoft.com/office/drawing/2014/main" val="20004"/>
+                      <a16:colId xmlns:a16="http://schemas.microsoft.com/office/drawing/2014/main" xmlns="" val="20004"/>
                     </a:ext>
                   </a:extLst>
                 </a:gridCol>
@@ -24718,7 +24733,7 @@
                 </a:tc>
                 <a:extLst>
                   <a:ext uri="{0D108BD9-81ED-4DB2-BD59-A6C34878D82A}">
-                    <a16:rowId xmlns="" xmlns:a16="http://schemas.microsoft.com/office/drawing/2014/main" val="10000"/>
+                    <a16:rowId xmlns:a16="http://schemas.microsoft.com/office/drawing/2014/main" xmlns="" val="10000"/>
                   </a:ext>
                 </a:extLst>
               </a:tr>
@@ -24840,7 +24855,7 @@
                 </a:tc>
                 <a:extLst>
                   <a:ext uri="{0D108BD9-81ED-4DB2-BD59-A6C34878D82A}">
-                    <a16:rowId xmlns="" xmlns:a16="http://schemas.microsoft.com/office/drawing/2014/main" val="10001"/>
+                    <a16:rowId xmlns:a16="http://schemas.microsoft.com/office/drawing/2014/main" xmlns="" val="10001"/>
                   </a:ext>
                 </a:extLst>
               </a:tr>
@@ -24980,7 +24995,7 @@
                 </a:tc>
                 <a:extLst>
                   <a:ext uri="{0D108BD9-81ED-4DB2-BD59-A6C34878D82A}">
-                    <a16:rowId xmlns="" xmlns:a16="http://schemas.microsoft.com/office/drawing/2014/main" val="10002"/>
+                    <a16:rowId xmlns:a16="http://schemas.microsoft.com/office/drawing/2014/main" xmlns="" val="10002"/>
                   </a:ext>
                 </a:extLst>
               </a:tr>
@@ -25122,7 +25137,7 @@
                 </a:tc>
                 <a:extLst>
                   <a:ext uri="{0D108BD9-81ED-4DB2-BD59-A6C34878D82A}">
-                    <a16:rowId xmlns="" xmlns:a16="http://schemas.microsoft.com/office/drawing/2014/main" val="10003"/>
+                    <a16:rowId xmlns:a16="http://schemas.microsoft.com/office/drawing/2014/main" xmlns="" val="10003"/>
                   </a:ext>
                 </a:extLst>
               </a:tr>
@@ -25259,7 +25274,7 @@
                 </a:tc>
                 <a:extLst>
                   <a:ext uri="{0D108BD9-81ED-4DB2-BD59-A6C34878D82A}">
-                    <a16:rowId xmlns="" xmlns:a16="http://schemas.microsoft.com/office/drawing/2014/main" val="10004"/>
+                    <a16:rowId xmlns:a16="http://schemas.microsoft.com/office/drawing/2014/main" xmlns="" val="10004"/>
                   </a:ext>
                 </a:extLst>
               </a:tr>
@@ -25391,7 +25406,7 @@
                 </a:tc>
                 <a:extLst>
                   <a:ext uri="{0D108BD9-81ED-4DB2-BD59-A6C34878D82A}">
-                    <a16:rowId xmlns="" xmlns:a16="http://schemas.microsoft.com/office/drawing/2014/main" val="10005"/>
+                    <a16:rowId xmlns:a16="http://schemas.microsoft.com/office/drawing/2014/main" xmlns="" val="10005"/>
                   </a:ext>
                 </a:extLst>
               </a:tr>
@@ -25552,7 +25567,7 @@
                 </a:tc>
                 <a:extLst>
                   <a:ext uri="{0D108BD9-81ED-4DB2-BD59-A6C34878D82A}">
-                    <a16:rowId xmlns="" xmlns:a16="http://schemas.microsoft.com/office/drawing/2014/main" val="10006"/>
+                    <a16:rowId xmlns:a16="http://schemas.microsoft.com/office/drawing/2014/main" xmlns="" val="10006"/>
                   </a:ext>
                 </a:extLst>
               </a:tr>
@@ -25679,7 +25694,7 @@
                 </a:tc>
                 <a:extLst>
                   <a:ext uri="{0D108BD9-81ED-4DB2-BD59-A6C34878D82A}">
-                    <a16:rowId xmlns="" xmlns:a16="http://schemas.microsoft.com/office/drawing/2014/main" val="10007"/>
+                    <a16:rowId xmlns:a16="http://schemas.microsoft.com/office/drawing/2014/main" xmlns="" val="10007"/>
                   </a:ext>
                 </a:extLst>
               </a:tr>
@@ -25806,7 +25821,7 @@
                 </a:tc>
                 <a:extLst>
                   <a:ext uri="{0D108BD9-81ED-4DB2-BD59-A6C34878D82A}">
-                    <a16:rowId xmlns="" xmlns:a16="http://schemas.microsoft.com/office/drawing/2014/main" val="10008"/>
+                    <a16:rowId xmlns:a16="http://schemas.microsoft.com/office/drawing/2014/main" xmlns="" val="10008"/>
                   </a:ext>
                 </a:extLst>
               </a:tr>
@@ -25962,7 +25977,7 @@
                 </a:tc>
                 <a:extLst>
                   <a:ext uri="{0D108BD9-81ED-4DB2-BD59-A6C34878D82A}">
-                    <a16:rowId xmlns="" xmlns:a16="http://schemas.microsoft.com/office/drawing/2014/main" val="10009"/>
+                    <a16:rowId xmlns:a16="http://schemas.microsoft.com/office/drawing/2014/main" xmlns="" val="10009"/>
                   </a:ext>
                 </a:extLst>
               </a:tr>
@@ -26089,7 +26104,7 @@
                 </a:tc>
                 <a:extLst>
                   <a:ext uri="{0D108BD9-81ED-4DB2-BD59-A6C34878D82A}">
-                    <a16:rowId xmlns="" xmlns:a16="http://schemas.microsoft.com/office/drawing/2014/main" val="10010"/>
+                    <a16:rowId xmlns:a16="http://schemas.microsoft.com/office/drawing/2014/main" xmlns="" val="10010"/>
                   </a:ext>
                 </a:extLst>
               </a:tr>
@@ -26250,7 +26265,7 @@
                 </a:tc>
                 <a:extLst>
                   <a:ext uri="{0D108BD9-81ED-4DB2-BD59-A6C34878D82A}">
-                    <a16:rowId xmlns="" xmlns:a16="http://schemas.microsoft.com/office/drawing/2014/main" val="10011"/>
+                    <a16:rowId xmlns:a16="http://schemas.microsoft.com/office/drawing/2014/main" xmlns="" val="10011"/>
                   </a:ext>
                 </a:extLst>
               </a:tr>
@@ -26411,7 +26426,7 @@
                 </a:tc>
                 <a:extLst>
                   <a:ext uri="{0D108BD9-81ED-4DB2-BD59-A6C34878D82A}">
-                    <a16:rowId xmlns="" xmlns:a16="http://schemas.microsoft.com/office/drawing/2014/main" val="10012"/>
+                    <a16:rowId xmlns:a16="http://schemas.microsoft.com/office/drawing/2014/main" xmlns="" val="10012"/>
                   </a:ext>
                 </a:extLst>
               </a:tr>

</xml_diff>